<commit_message>
Updated my questions in PPT file
</commit_message>
<xml_diff>
--- a/RecoverdDFTppt_Mark.pptx
+++ b/RecoverdDFTppt_Mark.pptx
@@ -5,7 +5,7 @@
     <p:sldMasterId id="2147483648" r:id="rId1"/>
   </p:sldMasterIdLst>
   <p:notesMasterIdLst>
-    <p:notesMasterId r:id="rId14"/>
+    <p:notesMasterId r:id="rId16"/>
   </p:notesMasterIdLst>
   <p:sldIdLst>
     <p:sldId id="256" r:id="rId2"/>
@@ -18,8 +18,10 @@
     <p:sldId id="262" r:id="rId9"/>
     <p:sldId id="265" r:id="rId10"/>
     <p:sldId id="267" r:id="rId11"/>
-    <p:sldId id="266" r:id="rId12"/>
-    <p:sldId id="260" r:id="rId13"/>
+    <p:sldId id="268" r:id="rId12"/>
+    <p:sldId id="269" r:id="rId13"/>
+    <p:sldId id="266" r:id="rId14"/>
+    <p:sldId id="260" r:id="rId15"/>
   </p:sldIdLst>
   <p:sldSz cx="12192000" cy="6858000"/>
   <p:notesSz cx="6858000" cy="9144000"/>
@@ -220,7 +222,7 @@
           <a:p>
             <a:fld id="{96F2C86F-4A2D-4626-A0AA-6F1FB8EFB446}" type="datetimeFigureOut">
               <a:rPr lang="en-US" smtClean="0"/>
-              <a:t>8/29/2020</a:t>
+              <a:t>8/30/2020</a:t>
             </a:fld>
             <a:endParaRPr lang="en-US"/>
           </a:p>
@@ -814,7 +816,7 @@
           <a:p>
             <a:fld id="{A68A2230-04CB-441E-9157-E70EC1ED1AFA}" type="datetimeFigureOut">
               <a:rPr lang="en-US" smtClean="0"/>
-              <a:t>8/29/2020</a:t>
+              <a:t>8/30/2020</a:t>
             </a:fld>
             <a:endParaRPr lang="en-US"/>
           </a:p>
@@ -1012,7 +1014,7 @@
           <a:p>
             <a:fld id="{A68A2230-04CB-441E-9157-E70EC1ED1AFA}" type="datetimeFigureOut">
               <a:rPr lang="en-US" smtClean="0"/>
-              <a:t>8/29/2020</a:t>
+              <a:t>8/30/2020</a:t>
             </a:fld>
             <a:endParaRPr lang="en-US"/>
           </a:p>
@@ -1220,7 +1222,7 @@
           <a:p>
             <a:fld id="{A68A2230-04CB-441E-9157-E70EC1ED1AFA}" type="datetimeFigureOut">
               <a:rPr lang="en-US" smtClean="0"/>
-              <a:t>8/29/2020</a:t>
+              <a:t>8/30/2020</a:t>
             </a:fld>
             <a:endParaRPr lang="en-US"/>
           </a:p>
@@ -1418,7 +1420,7 @@
           <a:p>
             <a:fld id="{A68A2230-04CB-441E-9157-E70EC1ED1AFA}" type="datetimeFigureOut">
               <a:rPr lang="en-US" smtClean="0"/>
-              <a:t>8/29/2020</a:t>
+              <a:t>8/30/2020</a:t>
             </a:fld>
             <a:endParaRPr lang="en-US"/>
           </a:p>
@@ -1693,7 +1695,7 @@
           <a:p>
             <a:fld id="{A68A2230-04CB-441E-9157-E70EC1ED1AFA}" type="datetimeFigureOut">
               <a:rPr lang="en-US" smtClean="0"/>
-              <a:t>8/29/2020</a:t>
+              <a:t>8/30/2020</a:t>
             </a:fld>
             <a:endParaRPr lang="en-US"/>
           </a:p>
@@ -1958,7 +1960,7 @@
           <a:p>
             <a:fld id="{A68A2230-04CB-441E-9157-E70EC1ED1AFA}" type="datetimeFigureOut">
               <a:rPr lang="en-US" smtClean="0"/>
-              <a:t>8/29/2020</a:t>
+              <a:t>8/30/2020</a:t>
             </a:fld>
             <a:endParaRPr lang="en-US"/>
           </a:p>
@@ -2370,7 +2372,7 @@
           <a:p>
             <a:fld id="{A68A2230-04CB-441E-9157-E70EC1ED1AFA}" type="datetimeFigureOut">
               <a:rPr lang="en-US" smtClean="0"/>
-              <a:t>8/29/2020</a:t>
+              <a:t>8/30/2020</a:t>
             </a:fld>
             <a:endParaRPr lang="en-US"/>
           </a:p>
@@ -2511,7 +2513,7 @@
           <a:p>
             <a:fld id="{A68A2230-04CB-441E-9157-E70EC1ED1AFA}" type="datetimeFigureOut">
               <a:rPr lang="en-US" smtClean="0"/>
-              <a:t>8/29/2020</a:t>
+              <a:t>8/30/2020</a:t>
             </a:fld>
             <a:endParaRPr lang="en-US"/>
           </a:p>
@@ -2624,7 +2626,7 @@
           <a:p>
             <a:fld id="{A68A2230-04CB-441E-9157-E70EC1ED1AFA}" type="datetimeFigureOut">
               <a:rPr lang="en-US" smtClean="0"/>
-              <a:t>8/29/2020</a:t>
+              <a:t>8/30/2020</a:t>
             </a:fld>
             <a:endParaRPr lang="en-US"/>
           </a:p>
@@ -2935,7 +2937,7 @@
           <a:p>
             <a:fld id="{A68A2230-04CB-441E-9157-E70EC1ED1AFA}" type="datetimeFigureOut">
               <a:rPr lang="en-US" smtClean="0"/>
-              <a:t>8/29/2020</a:t>
+              <a:t>8/30/2020</a:t>
             </a:fld>
             <a:endParaRPr lang="en-US"/>
           </a:p>
@@ -3223,7 +3225,7 @@
           <a:p>
             <a:fld id="{A68A2230-04CB-441E-9157-E70EC1ED1AFA}" type="datetimeFigureOut">
               <a:rPr lang="en-US" smtClean="0"/>
-              <a:t>8/29/2020</a:t>
+              <a:t>8/30/2020</a:t>
             </a:fld>
             <a:endParaRPr lang="en-US"/>
           </a:p>
@@ -3464,7 +3466,7 @@
           <a:p>
             <a:fld id="{A68A2230-04CB-441E-9157-E70EC1ED1AFA}" type="datetimeFigureOut">
               <a:rPr lang="en-US" smtClean="0"/>
-              <a:t>8/29/2020</a:t>
+              <a:t>8/30/2020</a:t>
             </a:fld>
             <a:endParaRPr lang="en-US"/>
           </a:p>
@@ -4122,6 +4124,346 @@
             <p:ph type="title"/>
           </p:nvPr>
         </p:nvSpPr>
+        <p:spPr>
+          <a:xfrm>
+            <a:off x="838200" y="365125"/>
+            <a:ext cx="10515600" cy="2035174"/>
+          </a:xfrm>
+        </p:spPr>
+        <p:txBody>
+          <a:bodyPr>
+            <a:normAutofit/>
+          </a:bodyPr>
+          <a:lstStyle/>
+          <a:p>
+            <a:r>
+              <a:rPr lang="en-US" dirty="0"/>
+              <a:t>QN: </a:t>
+            </a:r>
+            <a:r>
+              <a:rPr lang="en-US" b="1" i="0" dirty="0">
+                <a:solidFill>
+                  <a:srgbClr val="000000"/>
+                </a:solidFill>
+                <a:effectLst/>
+                <a:latin typeface="Helvetica Neue"/>
+              </a:rPr>
+              <a:t> </a:t>
+            </a:r>
+            <a:r>
+              <a:rPr lang="en-US" i="0" dirty="0">
+                <a:solidFill>
+                  <a:srgbClr val="000000"/>
+                </a:solidFill>
+                <a:effectLst/>
+              </a:rPr>
+              <a:t>Have the rooms availability in the homeless shelters been affected by the </a:t>
+            </a:r>
+            <a:r>
+              <a:rPr lang="en-US" i="0" dirty="0" err="1">
+                <a:solidFill>
+                  <a:srgbClr val="000000"/>
+                </a:solidFill>
+                <a:effectLst/>
+              </a:rPr>
+              <a:t>covid</a:t>
+            </a:r>
+            <a:r>
+              <a:rPr lang="en-US" i="0" dirty="0">
+                <a:solidFill>
+                  <a:srgbClr val="000000"/>
+                </a:solidFill>
+                <a:effectLst/>
+              </a:rPr>
+              <a:t> cases in the county of San Francisco?</a:t>
+            </a:r>
+            <a:endParaRPr lang="en-US" dirty="0"/>
+          </a:p>
+        </p:txBody>
+      </p:sp>
+      <p:sp>
+        <p:nvSpPr>
+          <p:cNvPr id="3" name="Content Placeholder 2">
+            <a:extLst>
+              <a:ext uri="{FF2B5EF4-FFF2-40B4-BE49-F238E27FC236}">
+                <a16:creationId xmlns:a16="http://schemas.microsoft.com/office/drawing/2014/main" id="{9875D5FB-597C-43A6-B437-0B3C198EC566}"/>
+              </a:ext>
+            </a:extLst>
+          </p:cNvPr>
+          <p:cNvSpPr>
+            <a:spLocks noGrp="1"/>
+          </p:cNvSpPr>
+          <p:nvPr>
+            <p:ph idx="1"/>
+          </p:nvPr>
+        </p:nvSpPr>
+        <p:spPr>
+          <a:xfrm>
+            <a:off x="838200" y="2400299"/>
+            <a:ext cx="10515600" cy="3776663"/>
+          </a:xfrm>
+        </p:spPr>
+        <p:txBody>
+          <a:bodyPr/>
+          <a:lstStyle/>
+          <a:p>
+            <a:r>
+              <a:rPr lang="en-US" dirty="0"/>
+              <a:t>We ran Independent Chi-Square analysis.</a:t>
+            </a:r>
+          </a:p>
+          <a:p>
+            <a:pPr lvl="1"/>
+            <a:r>
+              <a:rPr lang="en-US" dirty="0"/>
+              <a:t>Independent Chi-Square will determine whether “homeless cases" is influencing "rooms availability". </a:t>
+            </a:r>
+          </a:p>
+          <a:p>
+            <a:pPr lvl="1"/>
+            <a:r>
+              <a:rPr lang="en-US" dirty="0"/>
+              <a:t>We discovered that as the homeless cases increased, the rooms availability decreased in the county of San Francisco especially in the later months of June and July.</a:t>
+            </a:r>
+          </a:p>
+        </p:txBody>
+      </p:sp>
+    </p:spTree>
+    <p:extLst>
+      <p:ext uri="{BB962C8B-B14F-4D97-AF65-F5344CB8AC3E}">
+        <p14:creationId xmlns:p14="http://schemas.microsoft.com/office/powerpoint/2010/main" val="2945788942"/>
+      </p:ext>
+    </p:extLst>
+  </p:cSld>
+  <p:clrMapOvr>
+    <a:masterClrMapping/>
+  </p:clrMapOvr>
+</p:sld>
+</file>
+
+<file path=ppt/slides/slide12.xml><?xml version="1.0" encoding="utf-8"?>
+<p:sld xmlns:a="http://schemas.openxmlformats.org/drawingml/2006/main" xmlns:r="http://schemas.openxmlformats.org/officeDocument/2006/relationships" xmlns:p="http://schemas.openxmlformats.org/presentationml/2006/main">
+  <p:cSld>
+    <p:spTree>
+      <p:nvGrpSpPr>
+        <p:cNvPr id="1" name=""/>
+        <p:cNvGrpSpPr/>
+        <p:nvPr/>
+      </p:nvGrpSpPr>
+      <p:grpSpPr>
+        <a:xfrm>
+          <a:off x="0" y="0"/>
+          <a:ext cx="0" cy="0"/>
+          <a:chOff x="0" y="0"/>
+          <a:chExt cx="0" cy="0"/>
+        </a:xfrm>
+      </p:grpSpPr>
+      <p:sp>
+        <p:nvSpPr>
+          <p:cNvPr id="2" name="Title 1">
+            <a:extLst>
+              <a:ext uri="{FF2B5EF4-FFF2-40B4-BE49-F238E27FC236}">
+                <a16:creationId xmlns:a16="http://schemas.microsoft.com/office/drawing/2014/main" id="{AE3B0C92-8C33-47A9-94A2-801A38F6B3E0}"/>
+              </a:ext>
+            </a:extLst>
+          </p:cNvPr>
+          <p:cNvSpPr>
+            <a:spLocks noGrp="1"/>
+          </p:cNvSpPr>
+          <p:nvPr>
+            <p:ph type="title"/>
+          </p:nvPr>
+        </p:nvSpPr>
+        <p:spPr>
+          <a:xfrm>
+            <a:off x="838200" y="365125"/>
+            <a:ext cx="10515600" cy="2035174"/>
+          </a:xfrm>
+        </p:spPr>
+        <p:txBody>
+          <a:bodyPr>
+            <a:normAutofit/>
+          </a:bodyPr>
+          <a:lstStyle/>
+          <a:p>
+            <a:r>
+              <a:rPr lang="en-US" dirty="0"/>
+              <a:t>QN: </a:t>
+            </a:r>
+            <a:r>
+              <a:rPr lang="en-US" b="1" i="0" dirty="0">
+                <a:solidFill>
+                  <a:srgbClr val="000000"/>
+                </a:solidFill>
+                <a:effectLst/>
+                <a:latin typeface="Helvetica Neue"/>
+              </a:rPr>
+              <a:t> </a:t>
+            </a:r>
+            <a:r>
+              <a:rPr lang="en-US" i="0" dirty="0">
+                <a:solidFill>
+                  <a:srgbClr val="000000"/>
+                </a:solidFill>
+                <a:effectLst/>
+              </a:rPr>
+              <a:t>Online source has stated that the homeless population was hit 80% harder compared to the general public?</a:t>
+            </a:r>
+            <a:endParaRPr lang="en-US" dirty="0"/>
+          </a:p>
+        </p:txBody>
+      </p:sp>
+      <p:sp>
+        <p:nvSpPr>
+          <p:cNvPr id="3" name="Content Placeholder 2">
+            <a:extLst>
+              <a:ext uri="{FF2B5EF4-FFF2-40B4-BE49-F238E27FC236}">
+                <a16:creationId xmlns:a16="http://schemas.microsoft.com/office/drawing/2014/main" id="{9875D5FB-597C-43A6-B437-0B3C198EC566}"/>
+              </a:ext>
+            </a:extLst>
+          </p:cNvPr>
+          <p:cNvSpPr>
+            <a:spLocks noGrp="1"/>
+          </p:cNvSpPr>
+          <p:nvPr>
+            <p:ph idx="1"/>
+          </p:nvPr>
+        </p:nvSpPr>
+        <p:spPr>
+          <a:xfrm>
+            <a:off x="838200" y="2400299"/>
+            <a:ext cx="10515600" cy="3776663"/>
+          </a:xfrm>
+        </p:spPr>
+        <p:txBody>
+          <a:bodyPr>
+            <a:normAutofit fontScale="92500" lnSpcReduction="10000"/>
+          </a:bodyPr>
+          <a:lstStyle/>
+          <a:p>
+            <a:r>
+              <a:rPr lang="en-US" dirty="0"/>
+              <a:t>We ran Goodness of Fit Chi-Squares analysis.</a:t>
+            </a:r>
+          </a:p>
+          <a:p>
+            <a:pPr lvl="1"/>
+            <a:r>
+              <a:rPr lang="en-US" dirty="0"/>
+              <a:t>Goodness of Fit Chi-Squares will determine whether this percentage is true or not . </a:t>
+            </a:r>
+          </a:p>
+          <a:p>
+            <a:pPr lvl="1"/>
+            <a:r>
+              <a:rPr lang="en-US" dirty="0"/>
+              <a:t>We discovered that this percentage isn’t even close to the real data. </a:t>
+            </a:r>
+          </a:p>
+          <a:p>
+            <a:r>
+              <a:rPr lang="en-US" dirty="0"/>
+              <a:t>We ran Two Proportion z-test analysis.</a:t>
+            </a:r>
+          </a:p>
+          <a:p>
+            <a:pPr lvl="1"/>
+            <a:r>
+              <a:rPr lang="en-US" dirty="0"/>
+              <a:t>Two Proportion z-test will determine the proportions of the cases in the 2 populations so we can know the difference in percentage. </a:t>
+            </a:r>
+          </a:p>
+          <a:p>
+            <a:pPr lvl="1"/>
+            <a:r>
+              <a:rPr lang="en-US" dirty="0"/>
+              <a:t>We discovered that the homeless were impacted by 2.51% compared to its own population. And the general public were impacted by 0.71 compared to its own population. </a:t>
+            </a:r>
+          </a:p>
+          <a:p>
+            <a:pPr lvl="1"/>
+            <a:r>
+              <a:rPr lang="en-US" dirty="0"/>
+              <a:t>Using this tool @ </a:t>
+            </a:r>
+            <a:r>
+              <a:rPr lang="en-US" sz="1500" dirty="0">
+                <a:hlinkClick r:id="rId2"/>
+              </a:rPr>
+              <a:t>https://www.calculatorsoup.com/calculators/algebra/percent-difference-calculator.php</a:t>
+            </a:r>
+            <a:r>
+              <a:rPr lang="en-US" sz="1500" dirty="0"/>
+              <a:t> </a:t>
+            </a:r>
+          </a:p>
+          <a:p>
+            <a:pPr marL="457200" lvl="1" indent="0">
+              <a:buNone/>
+            </a:pPr>
+            <a:r>
+              <a:rPr lang="en-US" sz="1500" dirty="0"/>
+              <a:t>      </a:t>
+            </a:r>
+            <a:r>
+              <a:rPr lang="en-US" dirty="0"/>
+              <a:t>we conclude that the Homeless was hit %111.8 harder than the general public. </a:t>
+            </a:r>
+          </a:p>
+          <a:p>
+            <a:pPr marL="457200" lvl="1" indent="0">
+              <a:buNone/>
+            </a:pPr>
+            <a:endParaRPr lang="en-US" dirty="0"/>
+          </a:p>
+        </p:txBody>
+      </p:sp>
+    </p:spTree>
+    <p:extLst>
+      <p:ext uri="{BB962C8B-B14F-4D97-AF65-F5344CB8AC3E}">
+        <p14:creationId xmlns:p14="http://schemas.microsoft.com/office/powerpoint/2010/main" val="1512967047"/>
+      </p:ext>
+    </p:extLst>
+  </p:cSld>
+  <p:clrMapOvr>
+    <a:masterClrMapping/>
+  </p:clrMapOvr>
+</p:sld>
+</file>
+
+<file path=ppt/slides/slide13.xml><?xml version="1.0" encoding="utf-8"?>
+<p:sld xmlns:a="http://schemas.openxmlformats.org/drawingml/2006/main" xmlns:r="http://schemas.openxmlformats.org/officeDocument/2006/relationships" xmlns:p="http://schemas.openxmlformats.org/presentationml/2006/main">
+  <p:cSld>
+    <p:spTree>
+      <p:nvGrpSpPr>
+        <p:cNvPr id="1" name=""/>
+        <p:cNvGrpSpPr/>
+        <p:nvPr/>
+      </p:nvGrpSpPr>
+      <p:grpSpPr>
+        <a:xfrm>
+          <a:off x="0" y="0"/>
+          <a:ext cx="0" cy="0"/>
+          <a:chOff x="0" y="0"/>
+          <a:chExt cx="0" cy="0"/>
+        </a:xfrm>
+      </p:grpSpPr>
+      <p:sp>
+        <p:nvSpPr>
+          <p:cNvPr id="2" name="Title 1">
+            <a:extLst>
+              <a:ext uri="{FF2B5EF4-FFF2-40B4-BE49-F238E27FC236}">
+                <a16:creationId xmlns:a16="http://schemas.microsoft.com/office/drawing/2014/main" id="{AE3B0C92-8C33-47A9-94A2-801A38F6B3E0}"/>
+              </a:ext>
+            </a:extLst>
+          </p:cNvPr>
+          <p:cNvSpPr>
+            <a:spLocks noGrp="1"/>
+          </p:cNvSpPr>
+          <p:nvPr>
+            <p:ph type="title"/>
+          </p:nvPr>
+        </p:nvSpPr>
         <p:spPr/>
         <p:txBody>
           <a:bodyPr/>
@@ -4169,7 +4511,7 @@
 </p:sld>
 </file>
 
-<file path=ppt/slides/slide12.xml><?xml version="1.0" encoding="utf-8"?>
+<file path=ppt/slides/slide14.xml><?xml version="1.0" encoding="utf-8"?>
 <p:sld xmlns:a="http://schemas.openxmlformats.org/drawingml/2006/main" xmlns:r="http://schemas.openxmlformats.org/officeDocument/2006/relationships" xmlns:p="http://schemas.openxmlformats.org/presentationml/2006/main">
   <p:cSld>
     <p:spTree>

</xml_diff>